<commit_message>
PPT completed except for authentication technique
</commit_message>
<xml_diff>
--- a/Project/Extending AES to 192- and 265-bits.pptx
+++ b/Project/Extending AES to 192- and 265-bits.pptx
@@ -6273,7 +6273,7 @@
       </p:sp>
       <p:pic>
         <p:nvPicPr>
-          <p:cNvPr id="6" name="Picture 5"/>
+          <p:cNvPr id="4" name="Picture 3"/>
           <p:cNvPicPr>
             <a:picLocks noChangeAspect="1"/>
           </p:cNvPicPr>
@@ -6287,8 +6287,8 @@
         </p:blipFill>
         <p:spPr>
           <a:xfrm>
-            <a:off x="1069847" y="1847198"/>
-            <a:ext cx="7549806" cy="2132005"/>
+            <a:off x="912222" y="4127863"/>
+            <a:ext cx="9929949" cy="2468880"/>
           </a:xfrm>
           <a:prstGeom prst="rect">
             <a:avLst/>
@@ -6297,7 +6297,7 @@
       </p:pic>
       <p:pic>
         <p:nvPicPr>
-          <p:cNvPr id="4" name="Picture 3"/>
+          <p:cNvPr id="7" name="Picture 6"/>
           <p:cNvPicPr>
             <a:picLocks noChangeAspect="1"/>
           </p:cNvPicPr>
@@ -6311,8 +6311,8 @@
         </p:blipFill>
         <p:spPr>
           <a:xfrm>
-            <a:off x="912222" y="4127863"/>
-            <a:ext cx="9929949" cy="2468880"/>
+            <a:off x="912222" y="1852455"/>
+            <a:ext cx="9747069" cy="2275408"/>
           </a:xfrm>
           <a:prstGeom prst="rect">
             <a:avLst/>
@@ -6344,7 +6344,136 @@
   <p:timing>
     <p:tnLst>
       <p:par>
-        <p:cTn id="1" dur="indefinite" restart="never" nodeType="tmRoot"/>
+        <p:cTn id="1" dur="indefinite" restart="never" nodeType="tmRoot">
+          <p:childTnLst>
+            <p:seq concurrent="1" nextAc="seek">
+              <p:cTn id="2" dur="indefinite" nodeType="mainSeq">
+                <p:childTnLst>
+                  <p:par>
+                    <p:cTn id="3" fill="hold">
+                      <p:stCondLst>
+                        <p:cond delay="indefinite"/>
+                      </p:stCondLst>
+                      <p:childTnLst>
+                        <p:par>
+                          <p:cTn id="4" fill="hold">
+                            <p:stCondLst>
+                              <p:cond delay="0"/>
+                            </p:stCondLst>
+                            <p:childTnLst>
+                              <p:par>
+                                <p:cTn id="5" presetID="16" presetClass="entr" presetSubtype="21" fill="hold" nodeType="clickEffect">
+                                  <p:stCondLst>
+                                    <p:cond delay="0"/>
+                                  </p:stCondLst>
+                                  <p:childTnLst>
+                                    <p:set>
+                                      <p:cBhvr>
+                                        <p:cTn id="6" dur="1" fill="hold">
+                                          <p:stCondLst>
+                                            <p:cond delay="0"/>
+                                          </p:stCondLst>
+                                        </p:cTn>
+                                        <p:tgtEl>
+                                          <p:spTgt spid="7"/>
+                                        </p:tgtEl>
+                                        <p:attrNameLst>
+                                          <p:attrName>style.visibility</p:attrName>
+                                        </p:attrNameLst>
+                                      </p:cBhvr>
+                                      <p:to>
+                                        <p:strVal val="visible"/>
+                                      </p:to>
+                                    </p:set>
+                                    <p:animEffect transition="in" filter="barn(inVertical)">
+                                      <p:cBhvr>
+                                        <p:cTn id="7" dur="500"/>
+                                        <p:tgtEl>
+                                          <p:spTgt spid="7"/>
+                                        </p:tgtEl>
+                                      </p:cBhvr>
+                                    </p:animEffect>
+                                  </p:childTnLst>
+                                </p:cTn>
+                              </p:par>
+                            </p:childTnLst>
+                          </p:cTn>
+                        </p:par>
+                      </p:childTnLst>
+                    </p:cTn>
+                  </p:par>
+                  <p:par>
+                    <p:cTn id="8" fill="hold">
+                      <p:stCondLst>
+                        <p:cond delay="indefinite"/>
+                      </p:stCondLst>
+                      <p:childTnLst>
+                        <p:par>
+                          <p:cTn id="9" fill="hold">
+                            <p:stCondLst>
+                              <p:cond delay="0"/>
+                            </p:stCondLst>
+                            <p:childTnLst>
+                              <p:par>
+                                <p:cTn id="10" presetID="16" presetClass="entr" presetSubtype="21" fill="hold" nodeType="clickEffect">
+                                  <p:stCondLst>
+                                    <p:cond delay="0"/>
+                                  </p:stCondLst>
+                                  <p:childTnLst>
+                                    <p:set>
+                                      <p:cBhvr>
+                                        <p:cTn id="11" dur="1" fill="hold">
+                                          <p:stCondLst>
+                                            <p:cond delay="0"/>
+                                          </p:stCondLst>
+                                        </p:cTn>
+                                        <p:tgtEl>
+                                          <p:spTgt spid="4"/>
+                                        </p:tgtEl>
+                                        <p:attrNameLst>
+                                          <p:attrName>style.visibility</p:attrName>
+                                        </p:attrNameLst>
+                                      </p:cBhvr>
+                                      <p:to>
+                                        <p:strVal val="visible"/>
+                                      </p:to>
+                                    </p:set>
+                                    <p:animEffect transition="in" filter="barn(inVertical)">
+                                      <p:cBhvr>
+                                        <p:cTn id="12" dur="500"/>
+                                        <p:tgtEl>
+                                          <p:spTgt spid="4"/>
+                                        </p:tgtEl>
+                                      </p:cBhvr>
+                                    </p:animEffect>
+                                  </p:childTnLst>
+                                </p:cTn>
+                              </p:par>
+                            </p:childTnLst>
+                          </p:cTn>
+                        </p:par>
+                      </p:childTnLst>
+                    </p:cTn>
+                  </p:par>
+                </p:childTnLst>
+              </p:cTn>
+              <p:prevCondLst>
+                <p:cond evt="onPrev" delay="0">
+                  <p:tgtEl>
+                    <p:sldTgt/>
+                  </p:tgtEl>
+                </p:cond>
+              </p:prevCondLst>
+              <p:nextCondLst>
+                <p:cond evt="onNext" delay="0">
+                  <p:tgtEl>
+                    <p:sldTgt/>
+                  </p:tgtEl>
+                </p:cond>
+              </p:nextCondLst>
+            </p:seq>
+          </p:childTnLst>
+        </p:cTn>
       </p:par>
     </p:tnLst>
   </p:timing>
@@ -6480,6 +6609,10 @@
           <a:bodyPr/>
           <a:lstStyle/>
           <a:p>
+            <a:r>
+              <a:rPr lang="en-US" dirty="0" smtClean="0"/>
+              <a:t>Authentication technique</a:t>
+            </a:r>
             <a:endParaRPr lang="en-US" dirty="0"/>
           </a:p>
         </p:txBody>
@@ -6513,6 +6646,18 @@
   <p:clrMapOvr>
     <a:masterClrMapping/>
   </p:clrMapOvr>
+  <mc:AlternateContent xmlns:mc="http://schemas.openxmlformats.org/markup-compatibility/2006">
+    <mc:Choice xmlns:p15="http://schemas.microsoft.com/office/powerpoint/2012/main" Requires="p15">
+      <p:transition xmlns:p14="http://schemas.microsoft.com/office/powerpoint/2010/main" spd="slow" p14:dur="1250">
+        <p15:prstTrans prst="airplane"/>
+      </p:transition>
+    </mc:Choice>
+    <mc:Fallback>
+      <p:transition spd="slow">
+        <p:fade/>
+      </p:transition>
+    </mc:Fallback>
+  </mc:AlternateContent>
   <p:timing>
     <p:tnLst>
       <p:par>

</xml_diff>

<commit_message>
Added a slide in the PPT
</commit_message>
<xml_diff>
--- a/Project/Extending AES to 192- and 265-bits.pptx
+++ b/Project/Extending AES to 192- and 265-bits.pptx
@@ -15,7 +15,8 @@
     <p:sldId id="262" r:id="rId9"/>
     <p:sldId id="266" r:id="rId10"/>
     <p:sldId id="265" r:id="rId11"/>
-    <p:sldId id="261" r:id="rId12"/>
+    <p:sldId id="267" r:id="rId12"/>
+    <p:sldId id="261" r:id="rId13"/>
   </p:sldIdLst>
   <p:sldSz cx="12192000" cy="6858000"/>
   <p:notesSz cx="6858000" cy="9144000"/>
@@ -525,7 +526,7 @@
           <a:p>
             <a:fld id="{D7E77BA1-EA20-4098-8544-0B06F732DE14}" type="datetimeFigureOut">
               <a:rPr lang="en-US" smtClean="0"/>
-              <a:t>5/2/2016</a:t>
+              <a:t>5/3/2016</a:t>
             </a:fld>
             <a:endParaRPr lang="en-US"/>
           </a:p>
@@ -704,7 +705,7 @@
           <a:p>
             <a:fld id="{D7E77BA1-EA20-4098-8544-0B06F732DE14}" type="datetimeFigureOut">
               <a:rPr lang="en-US" smtClean="0"/>
-              <a:t>5/2/2016</a:t>
+              <a:t>5/3/2016</a:t>
             </a:fld>
             <a:endParaRPr lang="en-US"/>
           </a:p>
@@ -884,7 +885,7 @@
           <a:p>
             <a:fld id="{D7E77BA1-EA20-4098-8544-0B06F732DE14}" type="datetimeFigureOut">
               <a:rPr lang="en-US" smtClean="0"/>
-              <a:t>5/2/2016</a:t>
+              <a:t>5/3/2016</a:t>
             </a:fld>
             <a:endParaRPr lang="en-US"/>
           </a:p>
@@ -1054,7 +1055,7 @@
           <a:p>
             <a:fld id="{D7E77BA1-EA20-4098-8544-0B06F732DE14}" type="datetimeFigureOut">
               <a:rPr lang="en-US" smtClean="0"/>
-              <a:t>5/2/2016</a:t>
+              <a:t>5/3/2016</a:t>
             </a:fld>
             <a:endParaRPr lang="en-US"/>
           </a:p>
@@ -1367,7 +1368,7 @@
           <a:p>
             <a:fld id="{D7E77BA1-EA20-4098-8544-0B06F732DE14}" type="datetimeFigureOut">
               <a:rPr lang="en-US" smtClean="0"/>
-              <a:t>5/2/2016</a:t>
+              <a:t>5/3/2016</a:t>
             </a:fld>
             <a:endParaRPr lang="en-US"/>
           </a:p>
@@ -1753,7 +1754,7 @@
           <a:p>
             <a:fld id="{D7E77BA1-EA20-4098-8544-0B06F732DE14}" type="datetimeFigureOut">
               <a:rPr lang="en-US" smtClean="0"/>
-              <a:t>5/2/2016</a:t>
+              <a:t>5/3/2016</a:t>
             </a:fld>
             <a:endParaRPr lang="en-US"/>
           </a:p>
@@ -2187,7 +2188,7 @@
           <a:p>
             <a:fld id="{D7E77BA1-EA20-4098-8544-0B06F732DE14}" type="datetimeFigureOut">
               <a:rPr lang="en-US" smtClean="0"/>
-              <a:t>5/2/2016</a:t>
+              <a:t>5/3/2016</a:t>
             </a:fld>
             <a:endParaRPr lang="en-US"/>
           </a:p>
@@ -2305,7 +2306,7 @@
           <a:p>
             <a:fld id="{D7E77BA1-EA20-4098-8544-0B06F732DE14}" type="datetimeFigureOut">
               <a:rPr lang="en-US" smtClean="0"/>
-              <a:t>5/2/2016</a:t>
+              <a:t>5/3/2016</a:t>
             </a:fld>
             <a:endParaRPr lang="en-US"/>
           </a:p>
@@ -2400,7 +2401,7 @@
           <a:p>
             <a:fld id="{D7E77BA1-EA20-4098-8544-0B06F732DE14}" type="datetimeFigureOut">
               <a:rPr lang="en-US" smtClean="0"/>
-              <a:t>5/2/2016</a:t>
+              <a:t>5/3/2016</a:t>
             </a:fld>
             <a:endParaRPr lang="en-US"/>
           </a:p>
@@ -2750,7 +2751,7 @@
           <a:p>
             <a:fld id="{D7E77BA1-EA20-4098-8544-0B06F732DE14}" type="datetimeFigureOut">
               <a:rPr lang="en-US" smtClean="0"/>
-              <a:t>5/2/2016</a:t>
+              <a:t>5/3/2016</a:t>
             </a:fld>
             <a:endParaRPr lang="en-US"/>
           </a:p>
@@ -3175,7 +3176,7 @@
           <a:p>
             <a:fld id="{D7E77BA1-EA20-4098-8544-0B06F732DE14}" type="datetimeFigureOut">
               <a:rPr lang="en-US" smtClean="0"/>
-              <a:t>5/2/2016</a:t>
+              <a:t>5/3/2016</a:t>
             </a:fld>
             <a:endParaRPr lang="en-US"/>
           </a:p>
@@ -3456,7 +3457,7 @@
           <a:p>
             <a:fld id="{D7E77BA1-EA20-4098-8544-0B06F732DE14}" type="datetimeFigureOut">
               <a:rPr lang="en-US" smtClean="0"/>
-              <a:t>5/2/2016</a:t>
+              <a:t>5/3/2016</a:t>
             </a:fld>
             <a:endParaRPr lang="en-US"/>
           </a:p>
@@ -4547,13 +4548,13 @@
   <p:clrMapOvr>
     <a:masterClrMapping/>
   </p:clrMapOvr>
-  <mc:AlternateContent xmlns:mc="http://schemas.openxmlformats.org/markup-compatibility/2006">
-    <mc:Choice xmlns:p15="http://schemas.microsoft.com/office/powerpoint/2012/main" Requires="p15">
+  <mc:AlternateContent xmlns:mc="http://schemas.openxmlformats.org/markup-compatibility/2006" xmlns:p15="http://schemas.microsoft.com/office/powerpoint/2012/main">
+    <mc:Choice Requires="p15">
       <p:transition xmlns:p14="http://schemas.microsoft.com/office/powerpoint/2010/main" spd="slow" p14:dur="2000">
         <p15:prstTrans prst="fracture"/>
       </p:transition>
     </mc:Choice>
-    <mc:Fallback>
+    <mc:Fallback xmlns="">
       <p:transition spd="slow">
         <p:fade/>
       </p:transition>
@@ -4586,6 +4587,85 @@
           <a:chExt cx="0" cy="0"/>
         </a:xfrm>
       </p:grpSpPr>
+      <p:pic>
+        <p:nvPicPr>
+          <p:cNvPr id="4" name="Picture 3"/>
+          <p:cNvPicPr>
+            <a:picLocks noChangeAspect="1"/>
+          </p:cNvPicPr>
+          <p:nvPr/>
+        </p:nvPicPr>
+        <p:blipFill>
+          <a:blip r:embed="rId2">
+            <a:extLst>
+              <a:ext uri="{28A0092B-C50C-407E-A947-70E740481C1C}">
+                <a14:useLocalDpi xmlns:a14="http://schemas.microsoft.com/office/drawing/2010/main" val="0"/>
+              </a:ext>
+            </a:extLst>
+          </a:blip>
+          <a:stretch>
+            <a:fillRect/>
+          </a:stretch>
+        </p:blipFill>
+        <p:spPr>
+          <a:xfrm>
+            <a:off x="1" y="-1"/>
+            <a:ext cx="12192000" cy="6874099"/>
+          </a:xfrm>
+          <a:prstGeom prst="rect">
+            <a:avLst/>
+          </a:prstGeom>
+        </p:spPr>
+      </p:pic>
+    </p:spTree>
+    <p:extLst>
+      <p:ext uri="{BB962C8B-B14F-4D97-AF65-F5344CB8AC3E}">
+        <p14:creationId xmlns:p14="http://schemas.microsoft.com/office/powerpoint/2010/main" val="1240672335"/>
+      </p:ext>
+    </p:extLst>
+  </p:cSld>
+  <p:clrMapOvr>
+    <a:masterClrMapping/>
+  </p:clrMapOvr>
+  <mc:AlternateContent xmlns:mc="http://schemas.openxmlformats.org/markup-compatibility/2006">
+    <mc:Choice xmlns:p14="http://schemas.microsoft.com/office/powerpoint/2010/main" Requires="p14">
+      <p:transition spd="slow" p14:dur="900">
+        <p14:warp dir="in"/>
+      </p:transition>
+    </mc:Choice>
+    <mc:Fallback>
+      <p:transition spd="slow">
+        <p:fade/>
+      </p:transition>
+    </mc:Fallback>
+  </mc:AlternateContent>
+  <p:timing>
+    <p:tnLst>
+      <p:par>
+        <p:cTn id="1" dur="indefinite" restart="never" nodeType="tmRoot"/>
+      </p:par>
+    </p:tnLst>
+  </p:timing>
+</p:sld>
+</file>
+
+<file path=ppt/slides/slide12.xml><?xml version="1.0" encoding="utf-8"?>
+<p:sld xmlns:a="http://schemas.openxmlformats.org/drawingml/2006/main" xmlns:r="http://schemas.openxmlformats.org/officeDocument/2006/relationships" xmlns:p="http://schemas.openxmlformats.org/presentationml/2006/main">
+  <p:cSld>
+    <p:spTree>
+      <p:nvGrpSpPr>
+        <p:cNvPr id="1" name=""/>
+        <p:cNvGrpSpPr/>
+        <p:nvPr/>
+      </p:nvGrpSpPr>
+      <p:grpSpPr>
+        <a:xfrm>
+          <a:off x="0" y="0"/>
+          <a:ext cx="0" cy="0"/>
+          <a:chOff x="0" y="0"/>
+          <a:chExt cx="0" cy="0"/>
+        </a:xfrm>
+      </p:grpSpPr>
       <p:sp>
         <p:nvSpPr>
           <p:cNvPr id="2" name="Title 1"/>
@@ -4677,9 +4757,54 @@
             </a:pPr>
             <a:r>
               <a:rPr lang="en-US" dirty="0" smtClean="0">
+                <a:hlinkClick r:id="rId2"/>
+              </a:rPr>
+              <a:t>Decryption Steps Image</a:t>
+            </a:r>
+            <a:endParaRPr lang="en-US" dirty="0" smtClean="0"/>
+          </a:p>
+          <a:p>
+            <a:pPr marL="457200" indent="-457200">
+              <a:buFont typeface="+mj-lt"/>
+              <a:buAutoNum type="arabicPeriod"/>
+            </a:pPr>
+            <a:r>
+              <a:rPr lang="en-US" dirty="0" smtClean="0">
                 <a:hlinkClick r:id="rId3"/>
               </a:rPr>
-              <a:t>Q &amp; A Image</a:t>
+              <a:t>Q &amp; A </a:t>
+            </a:r>
+            <a:r>
+              <a:rPr lang="en-US" dirty="0" smtClean="0">
+                <a:hlinkClick r:id="rId3"/>
+              </a:rPr>
+              <a:t>Image</a:t>
+            </a:r>
+            <a:endParaRPr lang="en-US" dirty="0" smtClean="0"/>
+          </a:p>
+          <a:p>
+            <a:pPr marL="457200" indent="-457200">
+              <a:buFont typeface="+mj-lt"/>
+              <a:buAutoNum type="arabicPeriod"/>
+            </a:pPr>
+            <a:r>
+              <a:rPr lang="en-US" dirty="0" smtClean="0">
+                <a:hlinkClick r:id="rId4"/>
+              </a:rPr>
+              <a:t>Encryption &amp; Decryption Algorithm Paper</a:t>
+            </a:r>
+            <a:endParaRPr lang="en-US" dirty="0" smtClean="0"/>
+          </a:p>
+          <a:p>
+            <a:pPr marL="457200" indent="-457200">
+              <a:buFont typeface="+mj-lt"/>
+              <a:buAutoNum type="arabicPeriod"/>
+            </a:pPr>
+            <a:r>
+              <a:rPr lang="en-US" dirty="0" smtClean="0">
+                <a:hlinkClick r:id="rId5"/>
+              </a:rPr>
+              <a:t>Thank You Image</a:t>
             </a:r>
             <a:endParaRPr lang="en-US" dirty="0"/>
           </a:p>
@@ -4695,13 +4820,13 @@
   <p:clrMapOvr>
     <a:masterClrMapping/>
   </p:clrMapOvr>
-  <mc:AlternateContent xmlns:mc="http://schemas.openxmlformats.org/markup-compatibility/2006">
-    <mc:Choice xmlns:p15="http://schemas.microsoft.com/office/powerpoint/2012/main" Requires="p15">
+  <mc:AlternateContent xmlns:mc="http://schemas.openxmlformats.org/markup-compatibility/2006" xmlns:p15="http://schemas.microsoft.com/office/powerpoint/2012/main">
+    <mc:Choice Requires="p15">
       <p:transition xmlns:p14="http://schemas.microsoft.com/office/powerpoint/2010/main" spd="slow" p14:dur="3250">
         <p15:prstTrans prst="origami"/>
       </p:transition>
     </mc:Choice>
-    <mc:Fallback>
+    <mc:Fallback xmlns="">
       <p:transition spd="slow">
         <p:fade/>
       </p:transition>
@@ -5657,13 +5782,13 @@
   <p:clrMapOvr>
     <a:masterClrMapping/>
   </p:clrMapOvr>
-  <mc:AlternateContent xmlns:mc="http://schemas.openxmlformats.org/markup-compatibility/2006">
-    <mc:Choice xmlns:p14="http://schemas.microsoft.com/office/powerpoint/2010/main" Requires="p14">
+  <mc:AlternateContent xmlns:mc="http://schemas.openxmlformats.org/markup-compatibility/2006" xmlns:p14="http://schemas.microsoft.com/office/powerpoint/2010/main">
+    <mc:Choice Requires="p14">
       <p:transition spd="slow" p14:dur="1600">
         <p14:prism isContent="1" isInverted="1"/>
       </p:transition>
     </mc:Choice>
-    <mc:Fallback>
+    <mc:Fallback xmlns="">
       <p:transition spd="slow">
         <p:fade/>
       </p:transition>
@@ -5998,13 +6123,13 @@
   <p:clrMapOvr>
     <a:masterClrMapping/>
   </p:clrMapOvr>
-  <mc:AlternateContent xmlns:mc="http://schemas.openxmlformats.org/markup-compatibility/2006">
-    <mc:Choice xmlns:p14="http://schemas.microsoft.com/office/powerpoint/2010/main" Requires="p14">
+  <mc:AlternateContent xmlns:mc="http://schemas.openxmlformats.org/markup-compatibility/2006" xmlns:p14="http://schemas.microsoft.com/office/powerpoint/2010/main">
+    <mc:Choice Requires="p14">
       <p:transition spd="slow" p14:dur="2000">
         <p14:prism isContent="1"/>
       </p:transition>
     </mc:Choice>
-    <mc:Fallback>
+    <mc:Fallback xmlns="">
       <p:transition spd="slow">
         <p:fade/>
       </p:transition>
@@ -6239,17 +6364,7 @@
                   </a:schemeClr>
                 </a:solidFill>
               </a:rPr>
-              <a:t> </a:t>
-            </a:r>
-            <a:r>
-              <a:rPr lang="en-US" i="1" dirty="0" smtClean="0">
-                <a:solidFill>
-                  <a:schemeClr val="tx2">
-                    <a:lumMod val="75000"/>
-                  </a:schemeClr>
-                </a:solidFill>
-              </a:rPr>
-              <a:t>&gt;  </a:t>
+              <a:t> &gt;  </a:t>
             </a:r>
             <a:r>
               <a:rPr lang="en-US" i="1" dirty="0" err="1" smtClean="0">
@@ -6329,13 +6444,13 @@
   <p:clrMapOvr>
     <a:masterClrMapping/>
   </p:clrMapOvr>
-  <mc:AlternateContent xmlns:mc="http://schemas.openxmlformats.org/markup-compatibility/2006">
-    <mc:Choice xmlns:p14="http://schemas.microsoft.com/office/powerpoint/2010/main" Requires="p14">
+  <mc:AlternateContent xmlns:mc="http://schemas.openxmlformats.org/markup-compatibility/2006" xmlns:p14="http://schemas.microsoft.com/office/powerpoint/2010/main">
+    <mc:Choice Requires="p14">
       <p:transition spd="slow" p14:dur="2000">
         <p14:prism isContent="1"/>
       </p:transition>
     </mc:Choice>
-    <mc:Fallback>
+    <mc:Fallback xmlns="">
       <p:transition spd="slow">
         <p:fade/>
       </p:transition>
@@ -6555,13 +6670,13 @@
   <p:clrMapOvr>
     <a:masterClrMapping/>
   </p:clrMapOvr>
-  <mc:AlternateContent xmlns:mc="http://schemas.openxmlformats.org/markup-compatibility/2006">
-    <mc:Choice xmlns:p14="http://schemas.microsoft.com/office/powerpoint/2010/main" Requires="p14">
+  <mc:AlternateContent xmlns:mc="http://schemas.openxmlformats.org/markup-compatibility/2006" xmlns:p14="http://schemas.microsoft.com/office/powerpoint/2010/main">
+    <mc:Choice Requires="p14">
       <p:transition spd="slow" p14:dur="1500">
         <p14:window dir="vert"/>
       </p:transition>
     </mc:Choice>
-    <mc:Fallback>
+    <mc:Fallback xmlns="">
       <p:transition spd="slow">
         <p:fade/>
       </p:transition>
@@ -6646,13 +6761,13 @@
   <p:clrMapOvr>
     <a:masterClrMapping/>
   </p:clrMapOvr>
-  <mc:AlternateContent xmlns:mc="http://schemas.openxmlformats.org/markup-compatibility/2006">
-    <mc:Choice xmlns:p15="http://schemas.microsoft.com/office/powerpoint/2012/main" Requires="p15">
+  <mc:AlternateContent xmlns:mc="http://schemas.openxmlformats.org/markup-compatibility/2006" xmlns:p15="http://schemas.microsoft.com/office/powerpoint/2012/main">
+    <mc:Choice Requires="p15">
       <p:transition xmlns:p14="http://schemas.microsoft.com/office/powerpoint/2010/main" spd="slow" p14:dur="1250">
         <p15:prstTrans prst="airplane"/>
       </p:transition>
     </mc:Choice>
-    <mc:Fallback>
+    <mc:Fallback xmlns="">
       <p:transition spd="slow">
         <p:fade/>
       </p:transition>

</xml_diff>